<commit_message>
updated controller, file handler, main, added exercise.csv and jar for theme
</commit_message>
<xml_diff>
--- a/doc/DietManagerG3-Presentation.pptx
+++ b/doc/DietManagerG3-Presentation.pptx
@@ -230,7 +230,7 @@
             <a:fld id="{925A17EF-115B-4BB9-BF42-426DFD9E898A}" type="datetimeFigureOut">
               <a:rPr lang="en-US" smtClean="0"/>
               <a:pPr/>
-              <a:t>4/9/2025</a:t>
+              <a:t>4/10/2025</a:t>
             </a:fld>
             <a:endParaRPr lang="en-US"/>
           </a:p>
@@ -1553,7 +1553,7 @@
                 <a:ea typeface="Arial" panose="020B0604020202020204" pitchFamily="34" charset="0"/>
                 <a:cs typeface="Tahoma" panose="020B0604030504040204" pitchFamily="34" charset="0"/>
               </a:rPr>
-              <a:t>() on the Foods model, which delegates to the </a:t>
+              <a:t>() on the Foods model, which uses the </a:t>
             </a:r>
             <a:r>
               <a:rPr lang="en-US" sz="1800" dirty="0" err="1">
@@ -1562,7 +1562,7 @@
                 <a:ea typeface="Arial" panose="020B0604020202020204" pitchFamily="34" charset="0"/>
                 <a:cs typeface="Tahoma" panose="020B0604030504040204" pitchFamily="34" charset="0"/>
               </a:rPr>
-              <a:t>FileHandler.readFoods</a:t>
+              <a:t>readFoods</a:t>
             </a:r>
             <a:r>
               <a:rPr lang="en-US" sz="1800" dirty="0">
@@ -1571,7 +1571,7 @@
                 <a:ea typeface="Arial" panose="020B0604020202020204" pitchFamily="34" charset="0"/>
                 <a:cs typeface="Tahoma" panose="020B0604030504040204" pitchFamily="34" charset="0"/>
               </a:rPr>
-              <a:t>() method. This method first creates a </a:t>
+              <a:t>()  method from the </a:t>
             </a:r>
             <a:r>
               <a:rPr lang="en-US" sz="1800" dirty="0" err="1">
@@ -1580,7 +1580,7 @@
                 <a:ea typeface="Arial" panose="020B0604020202020204" pitchFamily="34" charset="0"/>
                 <a:cs typeface="Tahoma" panose="020B0604030504040204" pitchFamily="34" charset="0"/>
               </a:rPr>
-              <a:t>BasicFood</a:t>
+              <a:t>FileHandler</a:t>
             </a:r>
             <a:r>
               <a:rPr lang="en-US" sz="1800" dirty="0">
@@ -1589,7 +1589,7 @@
                 <a:ea typeface="Arial" panose="020B0604020202020204" pitchFamily="34" charset="0"/>
                 <a:cs typeface="Tahoma" panose="020B0604030504040204" pitchFamily="34" charset="0"/>
               </a:rPr>
-              <a:t> object for “Pizza Slice” and adds it to a list. In a second pass, it constructs a Recipe object for “PB+J Sandwich” by linking it to the already loaded ingredients like peanut butter and bread. The Recipe recursively calculates its nutrition by aggregating the values of its ingredients. Once the complete list of Food objects (both basic and composite) is returned to the model, the Controller calls </a:t>
+              <a:t>. This method first creates a </a:t>
             </a:r>
             <a:r>
               <a:rPr lang="en-US" sz="1800" dirty="0" err="1">
@@ -1598,7 +1598,7 @@
                 <a:ea typeface="Arial" panose="020B0604020202020204" pitchFamily="34" charset="0"/>
                 <a:cs typeface="Tahoma" panose="020B0604030504040204" pitchFamily="34" charset="0"/>
               </a:rPr>
-              <a:t>View.updateFoodList</a:t>
+              <a:t>BasicFood</a:t>
             </a:r>
             <a:r>
               <a:rPr lang="en-US" sz="1800" dirty="0">
@@ -1607,9 +1607,26 @@
                 <a:ea typeface="Arial" panose="020B0604020202020204" pitchFamily="34" charset="0"/>
                 <a:cs typeface="Tahoma" panose="020B0604030504040204" pitchFamily="34" charset="0"/>
               </a:rPr>
-              <a:t>() to display the full list to the user. This process showcases the Composite design pattern, where recipes and basic foods are treated uniformly, and highlights clear separation between the controller, model, view, and file </a:t>
-            </a:r>
-            <a:endParaRPr lang="en-US" dirty="0"/>
+              <a:t> object for “Pizza Slice” and adds it to a list. In a second pass, it constructs a Recipe object for “PB+J Sandwich” by linking it to the already loaded ingredients like peanut butter and bread. The Recipe recursively calculates its nutrition by gathering the values of its ingredients. Once the complete list of Food objects (both basic and composite) is returned to the model, the Controller calls </a:t>
+            </a:r>
+            <a:r>
+              <a:rPr lang="en-US" sz="1800" dirty="0" err="1">
+                <a:effectLst/>
+                <a:latin typeface="Times New Roman" panose="02020603050405020304" pitchFamily="18" charset="0"/>
+                <a:ea typeface="Arial" panose="020B0604020202020204" pitchFamily="34" charset="0"/>
+                <a:cs typeface="Tahoma" panose="020B0604030504040204" pitchFamily="34" charset="0"/>
+              </a:rPr>
+              <a:t>View.updateFoodList</a:t>
+            </a:r>
+            <a:r>
+              <a:rPr lang="en-US" sz="1800" dirty="0">
+                <a:effectLst/>
+                <a:latin typeface="Times New Roman" panose="02020603050405020304" pitchFamily="18" charset="0"/>
+                <a:ea typeface="Arial" panose="020B0604020202020204" pitchFamily="34" charset="0"/>
+                <a:cs typeface="Tahoma" panose="020B0604030504040204" pitchFamily="34" charset="0"/>
+              </a:rPr>
+              <a:t>() to display the full list to the user. This process showcases the Composite design pattern, where recipes and basic foods are treated equally, and highlights clear separation between the controller, model, view, and file </a:t>
+            </a:r>
           </a:p>
         </p:txBody>
       </p:sp>
@@ -1698,155 +1715,17 @@
               <a:buNone/>
             </a:pPr>
             <a:r>
-              <a:rPr lang="en-US" sz="1800" b="1" dirty="0">
-                <a:effectLst/>
-                <a:latin typeface="Times New Roman" panose="02020603050405020304" pitchFamily="18" charset="0"/>
-                <a:ea typeface="Times New Roman" panose="02020603050405020304" pitchFamily="18" charset="0"/>
-                <a:cs typeface="Times New Roman" panose="02020603050405020304" pitchFamily="18" charset="0"/>
-              </a:rPr>
-              <a:t>Sequence Diagram 2 – Logging Pizza Slice and PB+J Sandwich for current date</a:t>
-            </a:r>
-            <a:endParaRPr lang="en-US" sz="1800" dirty="0">
-              <a:effectLst/>
-              <a:latin typeface="Times New Roman" panose="02020603050405020304" pitchFamily="18" charset="0"/>
-              <a:ea typeface="Arial" panose="020B0604020202020204" pitchFamily="34" charset="0"/>
-              <a:cs typeface="Tahoma" panose="020B0604030504040204" pitchFamily="34" charset="0"/>
-            </a:endParaRPr>
-          </a:p>
-          <a:p>
-            <a:pPr>
-              <a:lnSpc>
-                <a:spcPct val="105000"/>
-              </a:lnSpc>
-              <a:spcBef>
-                <a:spcPts val="430"/>
-              </a:spcBef>
-            </a:pPr>
-            <a:r>
-              <a:rPr lang="en-US" sz="1800" b="0" kern="0" dirty="0">
-                <a:effectLst/>
-                <a:latin typeface="Times New Roman" panose="02020603050405020304" pitchFamily="18" charset="0"/>
-                <a:ea typeface="Times New Roman" panose="02020603050405020304" pitchFamily="18" charset="0"/>
-                <a:cs typeface="FreeSans"/>
-              </a:rPr>
-              <a:t>This sequence diagram shows how the application logs multiple food entries for the current date. When the user clicks "Add Log Entry", the View calls </a:t>
-            </a:r>
-            <a:r>
-              <a:rPr lang="en-US" sz="1800" b="0" kern="0" dirty="0" err="1">
-                <a:effectLst/>
-                <a:latin typeface="Times New Roman" panose="02020603050405020304" pitchFamily="18" charset="0"/>
-                <a:ea typeface="Times New Roman" panose="02020603050405020304" pitchFamily="18" charset="0"/>
-                <a:cs typeface="FreeSans"/>
-              </a:rPr>
-              <a:t>AddLogButtonListener.actionPerformed</a:t>
-            </a:r>
-            <a:r>
-              <a:rPr lang="en-US" sz="1800" b="0" kern="0" dirty="0">
-                <a:effectLst/>
-                <a:latin typeface="Times New Roman" panose="02020603050405020304" pitchFamily="18" charset="0"/>
-                <a:ea typeface="Times New Roman" panose="02020603050405020304" pitchFamily="18" charset="0"/>
-                <a:cs typeface="FreeSans"/>
-              </a:rPr>
-              <a:t>(). The listener first gets the selected food names and retrieves the corresponding Food objects using </a:t>
-            </a:r>
-            <a:r>
-              <a:rPr lang="en-US" sz="1800" b="0" kern="0" dirty="0" err="1">
-                <a:effectLst/>
-                <a:latin typeface="Times New Roman" panose="02020603050405020304" pitchFamily="18" charset="0"/>
-                <a:ea typeface="Times New Roman" panose="02020603050405020304" pitchFamily="18" charset="0"/>
-                <a:cs typeface="FreeSans"/>
-              </a:rPr>
-              <a:t>Foods.findFoodByName</a:t>
-            </a:r>
-            <a:r>
-              <a:rPr lang="en-US" sz="1800" b="0" kern="0" dirty="0">
-                <a:effectLst/>
-                <a:latin typeface="Times New Roman" panose="02020603050405020304" pitchFamily="18" charset="0"/>
-                <a:ea typeface="Times New Roman" panose="02020603050405020304" pitchFamily="18" charset="0"/>
-                <a:cs typeface="FreeSans"/>
-              </a:rPr>
-              <a:t>(). It then prompts the user for servings of each item through </a:t>
-            </a:r>
-            <a:r>
-              <a:rPr lang="en-US" sz="1800" b="0" kern="0" dirty="0" err="1">
-                <a:effectLst/>
-                <a:latin typeface="Times New Roman" panose="02020603050405020304" pitchFamily="18" charset="0"/>
-                <a:ea typeface="Times New Roman" panose="02020603050405020304" pitchFamily="18" charset="0"/>
-                <a:cs typeface="FreeSans"/>
-              </a:rPr>
-              <a:t>View.promptForServingsForMultipleFoods</a:t>
-            </a:r>
-            <a:r>
-              <a:rPr lang="en-US" sz="1800" b="0" kern="0" dirty="0">
-                <a:effectLst/>
-                <a:latin typeface="Times New Roman" panose="02020603050405020304" pitchFamily="18" charset="0"/>
-                <a:ea typeface="Times New Roman" panose="02020603050405020304" pitchFamily="18" charset="0"/>
-                <a:cs typeface="FreeSans"/>
-              </a:rPr>
-              <a:t>(). The selected date is obtained via </a:t>
-            </a:r>
-            <a:r>
-              <a:rPr lang="en-US" sz="1800" b="0" kern="0" dirty="0" err="1">
-                <a:effectLst/>
-                <a:latin typeface="Times New Roman" panose="02020603050405020304" pitchFamily="18" charset="0"/>
-                <a:ea typeface="Times New Roman" panose="02020603050405020304" pitchFamily="18" charset="0"/>
-                <a:cs typeface="FreeSans"/>
-              </a:rPr>
-              <a:t>Controller.getCurrentDate</a:t>
-            </a:r>
-            <a:r>
-              <a:rPr lang="en-US" sz="1800" b="0" kern="0" dirty="0">
-                <a:effectLst/>
-                <a:latin typeface="Times New Roman" panose="02020603050405020304" pitchFamily="18" charset="0"/>
-                <a:ea typeface="Times New Roman" panose="02020603050405020304" pitchFamily="18" charset="0"/>
-                <a:cs typeface="FreeSans"/>
-              </a:rPr>
-              <a:t>(), and for each food, a new Log object is created and passed to </a:t>
-            </a:r>
-            <a:r>
-              <a:rPr lang="en-US" sz="1800" b="0" kern="0" dirty="0" err="1">
-                <a:effectLst/>
-                <a:latin typeface="Times New Roman" panose="02020603050405020304" pitchFamily="18" charset="0"/>
-                <a:ea typeface="Times New Roman" panose="02020603050405020304" pitchFamily="18" charset="0"/>
-                <a:cs typeface="FreeSans"/>
-              </a:rPr>
-              <a:t>Logs.addLog</a:t>
-            </a:r>
-            <a:r>
-              <a:rPr lang="en-US" sz="1800" b="0" kern="0" dirty="0">
-                <a:effectLst/>
-                <a:latin typeface="Times New Roman" panose="02020603050405020304" pitchFamily="18" charset="0"/>
-                <a:ea typeface="Times New Roman" panose="02020603050405020304" pitchFamily="18" charset="0"/>
-                <a:cs typeface="FreeSans"/>
-              </a:rPr>
-              <a:t>(). Once all logs are added, the listener requests the updated list of logs for the date and computes nutrition totals for calories, fat, carbs, and protein. These results are passed to the View for display, and finally, the updated logs are saved to the CSV </a:t>
-            </a:r>
-            <a:r>
-              <a:rPr lang="en-US" sz="1800" b="0" kern="0" dirty="0" err="1">
-                <a:effectLst/>
-                <a:latin typeface="Times New Roman" panose="02020603050405020304" pitchFamily="18" charset="0"/>
-                <a:ea typeface="Times New Roman" panose="02020603050405020304" pitchFamily="18" charset="0"/>
-                <a:cs typeface="FreeSans"/>
-              </a:rPr>
-              <a:t>file.diagram</a:t>
-            </a:r>
-            <a:r>
-              <a:rPr lang="en-US" sz="1800" b="0" kern="0" dirty="0">
-                <a:effectLst/>
-                <a:latin typeface="Times New Roman" panose="02020603050405020304" pitchFamily="18" charset="0"/>
-                <a:ea typeface="Times New Roman" panose="02020603050405020304" pitchFamily="18" charset="0"/>
-                <a:cs typeface="FreeSans"/>
-              </a:rPr>
-              <a:t>, it is an essential part of the logging logic handled internally.</a:t>
-            </a:r>
-            <a:endParaRPr lang="en-US" sz="1800" b="1" kern="0" dirty="0">
-              <a:effectLst/>
-              <a:latin typeface="Arial" panose="020B0604020202020204" pitchFamily="34" charset="0"/>
-              <a:ea typeface="Droid Sans Fallback"/>
-              <a:cs typeface="FreeSans"/>
-            </a:endParaRPr>
-          </a:p>
-          <a:p>
+              <a:rPr lang="en-US" sz="2800" dirty="0"/>
+              <a:t>This diagram shows how the app logs multiple foods for the same day. When the user clicks the "Add Log Entry" button, the view triggers the </a:t>
+            </a:r>
+            <a:r>
+              <a:rPr lang="en-US" sz="2800" dirty="0" err="1"/>
+              <a:t>AddLogButtonListener</a:t>
+            </a:r>
+            <a:r>
+              <a:rPr lang="en-US" sz="2800" dirty="0"/>
+              <a:t>. The listener gets the names of the selected foods and uses Foods to find their full info. It then asks the user how many servings they had of each food. After getting the current date from the Controller, the app creates a log for each food and adds it to the list of logs. Once all the logs are added, the app gets all logs for that date, updates the list shown on the screen, and calculates total calories, fat, carbs, and protein. These totals are shown in the app, and the updated logs are saved to the file so nothing is lost.</a:t>
+            </a:r>
             <a:endParaRPr lang="en-US" dirty="0"/>
           </a:p>
         </p:txBody>

</xml_diff>